<commit_message>
Final code all synthesizable
</commit_message>
<xml_diff>
--- a/Final/presentation.pptx
+++ b/Final/presentation.pptx
@@ -5,7 +5,7 @@
     <p:sldMasterId id="2147483660" r:id="rId1"/>
   </p:sldMasterIdLst>
   <p:notesMasterIdLst>
-    <p:notesMasterId r:id="rId43"/>
+    <p:notesMasterId r:id="rId44"/>
   </p:notesMasterIdLst>
   <p:sldIdLst>
     <p:sldId id="256" r:id="rId2"/>
@@ -32,23 +32,24 @@
     <p:sldId id="303" r:id="rId23"/>
     <p:sldId id="305" r:id="rId24"/>
     <p:sldId id="304" r:id="rId25"/>
-    <p:sldId id="280" r:id="rId26"/>
-    <p:sldId id="307" r:id="rId27"/>
-    <p:sldId id="308" r:id="rId28"/>
-    <p:sldId id="306" r:id="rId29"/>
-    <p:sldId id="283" r:id="rId30"/>
-    <p:sldId id="309" r:id="rId31"/>
-    <p:sldId id="310" r:id="rId32"/>
-    <p:sldId id="296" r:id="rId33"/>
-    <p:sldId id="293" r:id="rId34"/>
-    <p:sldId id="294" r:id="rId35"/>
-    <p:sldId id="295" r:id="rId36"/>
-    <p:sldId id="281" r:id="rId37"/>
-    <p:sldId id="297" r:id="rId38"/>
-    <p:sldId id="298" r:id="rId39"/>
-    <p:sldId id="299" r:id="rId40"/>
-    <p:sldId id="300" r:id="rId41"/>
-    <p:sldId id="301" r:id="rId42"/>
+    <p:sldId id="311" r:id="rId26"/>
+    <p:sldId id="280" r:id="rId27"/>
+    <p:sldId id="307" r:id="rId28"/>
+    <p:sldId id="308" r:id="rId29"/>
+    <p:sldId id="306" r:id="rId30"/>
+    <p:sldId id="283" r:id="rId31"/>
+    <p:sldId id="309" r:id="rId32"/>
+    <p:sldId id="310" r:id="rId33"/>
+    <p:sldId id="296" r:id="rId34"/>
+    <p:sldId id="293" r:id="rId35"/>
+    <p:sldId id="294" r:id="rId36"/>
+    <p:sldId id="295" r:id="rId37"/>
+    <p:sldId id="281" r:id="rId38"/>
+    <p:sldId id="297" r:id="rId39"/>
+    <p:sldId id="298" r:id="rId40"/>
+    <p:sldId id="299" r:id="rId41"/>
+    <p:sldId id="300" r:id="rId42"/>
+    <p:sldId id="301" r:id="rId43"/>
   </p:sldIdLst>
   <p:sldSz cx="9144000" cy="6858000" type="screen4x3"/>
   <p:notesSz cx="6858000" cy="9144000"/>
@@ -237,7 +238,7 @@
           <a:p>
             <a:fld id="{4A1D12F2-5BDF-EA44-8286-AF1103231802}" type="datetimeFigureOut">
               <a:rPr lang="en-US" smtClean="0"/>
-              <a:t>6/20/18</a:t>
+              <a:t>6/21/18</a:t>
             </a:fld>
             <a:endParaRPr lang="en-US"/>
           </a:p>
@@ -6481,7 +6482,9 @@
         </p:nvSpPr>
         <p:spPr/>
         <p:txBody>
-          <a:bodyPr/>
+          <a:bodyPr>
+            <a:normAutofit/>
+          </a:bodyPr>
           <a:lstStyle/>
           <a:p>
             <a:r>
@@ -6493,13 +6496,6 @@
             <a:pPr lvl="1"/>
             <a:r>
               <a:rPr lang="en-US" dirty="0"/>
-              <a:t>Forwarding</a:t>
-            </a:r>
-          </a:p>
-          <a:p>
-            <a:pPr lvl="1"/>
-            <a:r>
-              <a:rPr lang="en-US" dirty="0"/>
               <a:t>Jump instructions</a:t>
             </a:r>
           </a:p>
@@ -6508,6 +6504,13 @@
             <a:r>
               <a:rPr lang="en-US" dirty="0"/>
               <a:t>Branch</a:t>
+            </a:r>
+          </a:p>
+          <a:p>
+            <a:pPr lvl="1"/>
+            <a:r>
+              <a:rPr lang="en-US" dirty="0"/>
+              <a:t>Forwarding</a:t>
             </a:r>
           </a:p>
           <a:p>
@@ -7751,50 +7754,203 @@
           <p:cNvPr id="2" name="Title 1">
             <a:extLst>
               <a:ext uri="{FF2B5EF4-FFF2-40B4-BE49-F238E27FC236}">
-                <a16:creationId xmlns:a16="http://schemas.microsoft.com/office/drawing/2014/main" id="{AB2B35D5-AAA5-D64A-92D1-11BA8711E317}"/>
-              </a:ext>
-            </a:extLst>
-          </p:cNvPr>
-          <p:cNvSpPr>
-            <a:spLocks noGrp="1"/>
-          </p:cNvSpPr>
-          <p:nvPr>
-            <p:ph type="ctrTitle"/>
-          </p:nvPr>
-        </p:nvSpPr>
-        <p:spPr/>
-        <p:txBody>
-          <a:bodyPr/>
-          <a:lstStyle/>
+                <a16:creationId xmlns:a16="http://schemas.microsoft.com/office/drawing/2014/main" id="{E8CC686E-50E8-8D4E-9375-6C3E8E55C2FB}"/>
+              </a:ext>
+            </a:extLst>
+          </p:cNvPr>
+          <p:cNvSpPr>
+            <a:spLocks noGrp="1"/>
+          </p:cNvSpPr>
+          <p:nvPr>
+            <p:ph type="title"/>
+          </p:nvPr>
+        </p:nvSpPr>
+        <p:spPr/>
+        <p:txBody>
+          <a:bodyPr>
+            <a:normAutofit/>
+          </a:bodyPr>
+          <a:lstStyle/>
+          <a:p>
+            <a:r>
+              <a:rPr lang="en-US" sz="4000" b="1" dirty="0">
+                <a:solidFill>
+                  <a:srgbClr val="C00000"/>
+                </a:solidFill>
+              </a:rPr>
+              <a:t>Experiment</a:t>
+            </a:r>
+            <a:r>
+              <a:rPr lang="en-US" sz="4000" dirty="0"/>
+              <a:t>: AT</a:t>
+            </a:r>
+          </a:p>
+        </p:txBody>
+      </p:sp>
+      <p:sp>
+        <p:nvSpPr>
+          <p:cNvPr id="3" name="Content Placeholder 2">
+            <a:extLst>
+              <a:ext uri="{FF2B5EF4-FFF2-40B4-BE49-F238E27FC236}">
+                <a16:creationId xmlns:a16="http://schemas.microsoft.com/office/drawing/2014/main" id="{35008592-1637-274F-B15F-4E48CDEFE6D5}"/>
+              </a:ext>
+            </a:extLst>
+          </p:cNvPr>
+          <p:cNvSpPr>
+            <a:spLocks noGrp="1"/>
+          </p:cNvSpPr>
+          <p:nvPr>
+            <p:ph idx="1"/>
+          </p:nvPr>
+        </p:nvSpPr>
+        <p:spPr/>
+        <p:txBody>
+          <a:bodyPr/>
+          <a:lstStyle/>
+          <a:p>
+            <a:endParaRPr lang="en-US" dirty="0"/>
+          </a:p>
+          <a:p>
+            <a:r>
+              <a:rPr lang="en-US" dirty="0"/>
+              <a:t>Area: 		285477 (um</a:t>
+            </a:r>
+            <a:r>
+              <a:rPr lang="en-US" baseline="30000" dirty="0"/>
+              <a:t>2</a:t>
+            </a:r>
+            <a:r>
+              <a:rPr lang="en-US" dirty="0"/>
+              <a:t>)</a:t>
+            </a:r>
+          </a:p>
+          <a:p>
+            <a:endParaRPr lang="en-US" dirty="0"/>
+          </a:p>
+          <a:p>
+            <a:r>
+              <a:rPr lang="en-US" dirty="0"/>
+              <a:t>Total cycles:	2143 </a:t>
+            </a:r>
+            <a:r>
+              <a:rPr lang="en-US" sz="2000" dirty="0"/>
+              <a:t>(baseline </a:t>
+            </a:r>
+            <a:r>
+              <a:rPr lang="en-US" sz="2000" dirty="0" err="1"/>
+              <a:t>hasHazard</a:t>
+            </a:r>
+            <a:r>
+              <a:rPr lang="en-US" sz="2000" dirty="0"/>
+              <a:t>)</a:t>
+            </a:r>
+            <a:endParaRPr lang="en-US" dirty="0"/>
+          </a:p>
+          <a:p>
+            <a:endParaRPr lang="en-US" dirty="0"/>
+          </a:p>
+          <a:p>
+            <a:r>
+              <a:rPr lang="en-US" dirty="0"/>
+              <a:t>Clock cycle:	4.54 (ns)</a:t>
+            </a:r>
+          </a:p>
+          <a:p>
+            <a:endParaRPr lang="en-US" dirty="0"/>
+          </a:p>
           <a:p>
             <a:r>
               <a:rPr lang="en-US" b="1" dirty="0"/>
-              <a:t>Extensions</a:t>
-            </a:r>
-          </a:p>
-        </p:txBody>
-      </p:sp>
-      <p:sp>
-        <p:nvSpPr>
-          <p:cNvPr id="3" name="Subtitle 2">
-            <a:extLst>
-              <a:ext uri="{FF2B5EF4-FFF2-40B4-BE49-F238E27FC236}">
-                <a16:creationId xmlns:a16="http://schemas.microsoft.com/office/drawing/2014/main" id="{2103E6DD-2CA5-014E-85B3-021F69857D18}"/>
-              </a:ext>
-            </a:extLst>
-          </p:cNvPr>
-          <p:cNvSpPr>
-            <a:spLocks noGrp="1"/>
-          </p:cNvSpPr>
-          <p:nvPr>
-            <p:ph type="subTitle" idx="1"/>
-          </p:nvPr>
-        </p:nvSpPr>
-        <p:spPr/>
-        <p:txBody>
-          <a:bodyPr/>
-          <a:lstStyle/>
-          <a:p>
+              <a:t>A x T:		~2.78 x 10</a:t>
+            </a:r>
+            <a:r>
+              <a:rPr lang="en-US" b="1" baseline="30000" dirty="0"/>
+              <a:t>9</a:t>
+            </a:r>
+          </a:p>
+        </p:txBody>
+      </p:sp>
+      <p:sp>
+        <p:nvSpPr>
+          <p:cNvPr id="4" name="Date Placeholder 3">
+            <a:extLst>
+              <a:ext uri="{FF2B5EF4-FFF2-40B4-BE49-F238E27FC236}">
+                <a16:creationId xmlns:a16="http://schemas.microsoft.com/office/drawing/2014/main" id="{3A7EC980-CC9C-3640-B6E6-4E1DCDB0B6B7}"/>
+              </a:ext>
+            </a:extLst>
+          </p:cNvPr>
+          <p:cNvSpPr>
+            <a:spLocks noGrp="1"/>
+          </p:cNvSpPr>
+          <p:nvPr>
+            <p:ph type="dt" sz="half" idx="10"/>
+          </p:nvPr>
+        </p:nvSpPr>
+        <p:spPr/>
+        <p:txBody>
+          <a:bodyPr/>
+          <a:lstStyle/>
+          <a:p>
+            <a:r>
+              <a:rPr lang="en-US"/>
+              <a:t>2018.6.21</a:t>
+            </a:r>
+          </a:p>
+        </p:txBody>
+      </p:sp>
+      <p:sp>
+        <p:nvSpPr>
+          <p:cNvPr id="5" name="Footer Placeholder 4">
+            <a:extLst>
+              <a:ext uri="{FF2B5EF4-FFF2-40B4-BE49-F238E27FC236}">
+                <a16:creationId xmlns:a16="http://schemas.microsoft.com/office/drawing/2014/main" id="{BFA19976-FDB5-BF4E-B51B-0EE90918D2D8}"/>
+              </a:ext>
+            </a:extLst>
+          </p:cNvPr>
+          <p:cNvSpPr>
+            <a:spLocks noGrp="1"/>
+          </p:cNvSpPr>
+          <p:nvPr>
+            <p:ph type="ftr" sz="quarter" idx="11"/>
+          </p:nvPr>
+        </p:nvSpPr>
+        <p:spPr/>
+        <p:txBody>
+          <a:bodyPr/>
+          <a:lstStyle/>
+          <a:p>
+            <a:r>
+              <a:rPr lang="en-US"/>
+              <a:t>Digital System Design Final Project</a:t>
+            </a:r>
+          </a:p>
+        </p:txBody>
+      </p:sp>
+      <p:sp>
+        <p:nvSpPr>
+          <p:cNvPr id="6" name="Slide Number Placeholder 5">
+            <a:extLst>
+              <a:ext uri="{FF2B5EF4-FFF2-40B4-BE49-F238E27FC236}">
+                <a16:creationId xmlns:a16="http://schemas.microsoft.com/office/drawing/2014/main" id="{2CEAE185-9F4A-5E44-A383-B97B65CB93AE}"/>
+              </a:ext>
+            </a:extLst>
+          </p:cNvPr>
+          <p:cNvSpPr>
+            <a:spLocks noGrp="1"/>
+          </p:cNvSpPr>
+          <p:nvPr>
+            <p:ph type="sldNum" sz="quarter" idx="12"/>
+          </p:nvPr>
+        </p:nvSpPr>
+        <p:spPr/>
+        <p:txBody>
+          <a:bodyPr/>
+          <a:lstStyle/>
+          <a:p>
+            <a:fld id="{925529E9-10DA-9F4C-A966-BE767707771B}" type="slidenum">
+              <a:rPr lang="en-US" smtClean="0"/>
+              <a:t>25</a:t>
+            </a:fld>
             <a:endParaRPr lang="en-US"/>
           </a:p>
         </p:txBody>
@@ -7802,7 +7958,7 @@
     </p:spTree>
     <p:extLst>
       <p:ext uri="{BB962C8B-B14F-4D97-AF65-F5344CB8AC3E}">
-        <p14:creationId xmlns:p14="http://schemas.microsoft.com/office/powerpoint/2010/main" val="1049412195"/>
+        <p14:creationId xmlns:p14="http://schemas.microsoft.com/office/powerpoint/2010/main" val="3353987298"/>
       </p:ext>
     </p:extLst>
   </p:cSld>
@@ -7834,6 +7990,89 @@
           <p:cNvPr id="2" name="Title 1">
             <a:extLst>
               <a:ext uri="{FF2B5EF4-FFF2-40B4-BE49-F238E27FC236}">
+                <a16:creationId xmlns:a16="http://schemas.microsoft.com/office/drawing/2014/main" id="{AB2B35D5-AAA5-D64A-92D1-11BA8711E317}"/>
+              </a:ext>
+            </a:extLst>
+          </p:cNvPr>
+          <p:cNvSpPr>
+            <a:spLocks noGrp="1"/>
+          </p:cNvSpPr>
+          <p:nvPr>
+            <p:ph type="ctrTitle"/>
+          </p:nvPr>
+        </p:nvSpPr>
+        <p:spPr/>
+        <p:txBody>
+          <a:bodyPr/>
+          <a:lstStyle/>
+          <a:p>
+            <a:r>
+              <a:rPr lang="en-US" b="1" dirty="0"/>
+              <a:t>Extensions</a:t>
+            </a:r>
+          </a:p>
+        </p:txBody>
+      </p:sp>
+      <p:sp>
+        <p:nvSpPr>
+          <p:cNvPr id="3" name="Subtitle 2">
+            <a:extLst>
+              <a:ext uri="{FF2B5EF4-FFF2-40B4-BE49-F238E27FC236}">
+                <a16:creationId xmlns:a16="http://schemas.microsoft.com/office/drawing/2014/main" id="{2103E6DD-2CA5-014E-85B3-021F69857D18}"/>
+              </a:ext>
+            </a:extLst>
+          </p:cNvPr>
+          <p:cNvSpPr>
+            <a:spLocks noGrp="1"/>
+          </p:cNvSpPr>
+          <p:nvPr>
+            <p:ph type="subTitle" idx="1"/>
+          </p:nvPr>
+        </p:nvSpPr>
+        <p:spPr/>
+        <p:txBody>
+          <a:bodyPr/>
+          <a:lstStyle/>
+          <a:p>
+            <a:endParaRPr lang="en-US"/>
+          </a:p>
+        </p:txBody>
+      </p:sp>
+    </p:spTree>
+    <p:extLst>
+      <p:ext uri="{BB962C8B-B14F-4D97-AF65-F5344CB8AC3E}">
+        <p14:creationId xmlns:p14="http://schemas.microsoft.com/office/powerpoint/2010/main" val="1049412195"/>
+      </p:ext>
+    </p:extLst>
+  </p:cSld>
+  <p:clrMapOvr>
+    <a:masterClrMapping/>
+  </p:clrMapOvr>
+</p:sld>
+</file>
+
+<file path=ppt/slides/slide27.xml><?xml version="1.0" encoding="utf-8"?>
+<p:sld xmlns:a="http://schemas.openxmlformats.org/drawingml/2006/main" xmlns:r="http://schemas.openxmlformats.org/officeDocument/2006/relationships" xmlns:p="http://schemas.openxmlformats.org/presentationml/2006/main">
+  <p:cSld>
+    <p:spTree>
+      <p:nvGrpSpPr>
+        <p:cNvPr id="1" name=""/>
+        <p:cNvGrpSpPr/>
+        <p:nvPr/>
+      </p:nvGrpSpPr>
+      <p:grpSpPr>
+        <a:xfrm>
+          <a:off x="0" y="0"/>
+          <a:ext cx="0" cy="0"/>
+          <a:chOff x="0" y="0"/>
+          <a:chExt cx="0" cy="0"/>
+        </a:xfrm>
+      </p:grpSpPr>
+      <p:sp>
+        <p:nvSpPr>
+          <p:cNvPr id="2" name="Title 1">
+            <a:extLst>
+              <a:ext uri="{FF2B5EF4-FFF2-40B4-BE49-F238E27FC236}">
                 <a16:creationId xmlns:a16="http://schemas.microsoft.com/office/drawing/2014/main" id="{208A4E89-DED8-4244-A9AF-5218A09D6DCF}"/>
               </a:ext>
             </a:extLst>
@@ -7964,7 +8203,7 @@
           <a:p>
             <a:fld id="{925529E9-10DA-9F4C-A966-BE767707771B}" type="slidenum">
               <a:rPr lang="en-US" smtClean="0"/>
-              <a:t>26</a:t>
+              <a:t>27</a:t>
             </a:fld>
             <a:endParaRPr lang="en-US"/>
           </a:p>
@@ -8013,7 +8252,7 @@
 </p:sld>
 </file>
 
-<file path=ppt/slides/slide27.xml><?xml version="1.0" encoding="utf-8"?>
+<file path=ppt/slides/slide28.xml><?xml version="1.0" encoding="utf-8"?>
 <p:sld xmlns:a="http://schemas.openxmlformats.org/drawingml/2006/main" xmlns:r="http://schemas.openxmlformats.org/officeDocument/2006/relationships" xmlns:p="http://schemas.openxmlformats.org/presentationml/2006/main">
   <p:cSld>
     <p:spTree>
@@ -8194,7 +8433,7 @@
           <a:p>
             <a:fld id="{925529E9-10DA-9F4C-A966-BE767707771B}" type="slidenum">
               <a:rPr lang="en-US" smtClean="0"/>
-              <a:t>27</a:t>
+              <a:t>28</a:t>
             </a:fld>
             <a:endParaRPr lang="en-US"/>
           </a:p>
@@ -8243,7 +8482,7 @@
 </p:sld>
 </file>
 
-<file path=ppt/slides/slide28.xml><?xml version="1.0" encoding="utf-8"?>
+<file path=ppt/slides/slide29.xml><?xml version="1.0" encoding="utf-8"?>
 <p:sld xmlns:a="http://schemas.openxmlformats.org/drawingml/2006/main" xmlns:r="http://schemas.openxmlformats.org/officeDocument/2006/relationships" xmlns:p="http://schemas.openxmlformats.org/presentationml/2006/main">
   <p:cSld>
     <p:spTree>
@@ -8414,7 +8653,7 @@
           <a:p>
             <a:fld id="{925529E9-10DA-9F4C-A966-BE767707771B}" type="slidenum">
               <a:rPr lang="en-US" smtClean="0"/>
-              <a:t>28</a:t>
+              <a:t>29</a:t>
             </a:fld>
             <a:endParaRPr lang="en-US"/>
           </a:p>
@@ -8463,7 +8702,7 @@
 </p:sld>
 </file>
 
-<file path=ppt/slides/slide29.xml><?xml version="1.0" encoding="utf-8"?>
+<file path=ppt/slides/slide3.xml><?xml version="1.0" encoding="utf-8"?>
 <p:sld xmlns:a="http://schemas.openxmlformats.org/drawingml/2006/main" xmlns:r="http://schemas.openxmlformats.org/officeDocument/2006/relationships" xmlns:p="http://schemas.openxmlformats.org/presentationml/2006/main">
   <p:cSld>
     <p:spTree>
@@ -8485,6 +8724,89 @@
           <p:cNvPr id="2" name="Title 1">
             <a:extLst>
               <a:ext uri="{FF2B5EF4-FFF2-40B4-BE49-F238E27FC236}">
+                <a16:creationId xmlns:a16="http://schemas.microsoft.com/office/drawing/2014/main" id="{047045A8-64DE-3D45-9FA7-68ED7A0035A3}"/>
+              </a:ext>
+            </a:extLst>
+          </p:cNvPr>
+          <p:cNvSpPr>
+            <a:spLocks noGrp="1"/>
+          </p:cNvSpPr>
+          <p:nvPr>
+            <p:ph type="ctrTitle"/>
+          </p:nvPr>
+        </p:nvSpPr>
+        <p:spPr/>
+        <p:txBody>
+          <a:bodyPr/>
+          <a:lstStyle/>
+          <a:p>
+            <a:r>
+              <a:rPr lang="en-US" b="1" dirty="0"/>
+              <a:t>Architecture</a:t>
+            </a:r>
+          </a:p>
+        </p:txBody>
+      </p:sp>
+      <p:sp>
+        <p:nvSpPr>
+          <p:cNvPr id="3" name="Subtitle 2">
+            <a:extLst>
+              <a:ext uri="{FF2B5EF4-FFF2-40B4-BE49-F238E27FC236}">
+                <a16:creationId xmlns:a16="http://schemas.microsoft.com/office/drawing/2014/main" id="{4218C047-39FF-494A-9CBC-D1AF32AA3013}"/>
+              </a:ext>
+            </a:extLst>
+          </p:cNvPr>
+          <p:cNvSpPr>
+            <a:spLocks noGrp="1"/>
+          </p:cNvSpPr>
+          <p:nvPr>
+            <p:ph type="subTitle" idx="1"/>
+          </p:nvPr>
+        </p:nvSpPr>
+        <p:spPr/>
+        <p:txBody>
+          <a:bodyPr/>
+          <a:lstStyle/>
+          <a:p>
+            <a:endParaRPr lang="en-US"/>
+          </a:p>
+        </p:txBody>
+      </p:sp>
+    </p:spTree>
+    <p:extLst>
+      <p:ext uri="{BB962C8B-B14F-4D97-AF65-F5344CB8AC3E}">
+        <p14:creationId xmlns:p14="http://schemas.microsoft.com/office/powerpoint/2010/main" val="3505201683"/>
+      </p:ext>
+    </p:extLst>
+  </p:cSld>
+  <p:clrMapOvr>
+    <a:masterClrMapping/>
+  </p:clrMapOvr>
+</p:sld>
+</file>
+
+<file path=ppt/slides/slide30.xml><?xml version="1.0" encoding="utf-8"?>
+<p:sld xmlns:a="http://schemas.openxmlformats.org/drawingml/2006/main" xmlns:r="http://schemas.openxmlformats.org/officeDocument/2006/relationships" xmlns:p="http://schemas.openxmlformats.org/presentationml/2006/main">
+  <p:cSld>
+    <p:spTree>
+      <p:nvGrpSpPr>
+        <p:cNvPr id="1" name=""/>
+        <p:cNvGrpSpPr/>
+        <p:nvPr/>
+      </p:nvGrpSpPr>
+      <p:grpSpPr>
+        <a:xfrm>
+          <a:off x="0" y="0"/>
+          <a:ext cx="0" cy="0"/>
+          <a:chOff x="0" y="0"/>
+          <a:chExt cx="0" cy="0"/>
+        </a:xfrm>
+      </p:grpSpPr>
+      <p:sp>
+        <p:nvSpPr>
+          <p:cNvPr id="2" name="Title 1">
+            <a:extLst>
+              <a:ext uri="{FF2B5EF4-FFF2-40B4-BE49-F238E27FC236}">
                 <a16:creationId xmlns:a16="http://schemas.microsoft.com/office/drawing/2014/main" id="{4AC04C24-1033-3349-ABE5-DA5955F903A2}"/>
               </a:ext>
             </a:extLst>
@@ -8637,7 +8959,7 @@
           <a:p>
             <a:fld id="{925529E9-10DA-9F4C-A966-BE767707771B}" type="slidenum">
               <a:rPr lang="en-US" smtClean="0"/>
-              <a:t>29</a:t>
+              <a:t>30</a:t>
             </a:fld>
             <a:endParaRPr lang="en-US"/>
           </a:p>
@@ -8716,7 +9038,7 @@
 </p:sld>
 </file>
 
-<file path=ppt/slides/slide3.xml><?xml version="1.0" encoding="utf-8"?>
+<file path=ppt/slides/slide31.xml><?xml version="1.0" encoding="utf-8"?>
 <p:sld xmlns:a="http://schemas.openxmlformats.org/drawingml/2006/main" xmlns:r="http://schemas.openxmlformats.org/officeDocument/2006/relationships" xmlns:p="http://schemas.openxmlformats.org/presentationml/2006/main">
   <p:cSld>
     <p:spTree>
@@ -8738,89 +9060,6 @@
           <p:cNvPr id="2" name="Title 1">
             <a:extLst>
               <a:ext uri="{FF2B5EF4-FFF2-40B4-BE49-F238E27FC236}">
-                <a16:creationId xmlns:a16="http://schemas.microsoft.com/office/drawing/2014/main" id="{047045A8-64DE-3D45-9FA7-68ED7A0035A3}"/>
-              </a:ext>
-            </a:extLst>
-          </p:cNvPr>
-          <p:cNvSpPr>
-            <a:spLocks noGrp="1"/>
-          </p:cNvSpPr>
-          <p:nvPr>
-            <p:ph type="ctrTitle"/>
-          </p:nvPr>
-        </p:nvSpPr>
-        <p:spPr/>
-        <p:txBody>
-          <a:bodyPr/>
-          <a:lstStyle/>
-          <a:p>
-            <a:r>
-              <a:rPr lang="en-US" b="1" dirty="0"/>
-              <a:t>Architecture</a:t>
-            </a:r>
-          </a:p>
-        </p:txBody>
-      </p:sp>
-      <p:sp>
-        <p:nvSpPr>
-          <p:cNvPr id="3" name="Subtitle 2">
-            <a:extLst>
-              <a:ext uri="{FF2B5EF4-FFF2-40B4-BE49-F238E27FC236}">
-                <a16:creationId xmlns:a16="http://schemas.microsoft.com/office/drawing/2014/main" id="{4218C047-39FF-494A-9CBC-D1AF32AA3013}"/>
-              </a:ext>
-            </a:extLst>
-          </p:cNvPr>
-          <p:cNvSpPr>
-            <a:spLocks noGrp="1"/>
-          </p:cNvSpPr>
-          <p:nvPr>
-            <p:ph type="subTitle" idx="1"/>
-          </p:nvPr>
-        </p:nvSpPr>
-        <p:spPr/>
-        <p:txBody>
-          <a:bodyPr/>
-          <a:lstStyle/>
-          <a:p>
-            <a:endParaRPr lang="en-US"/>
-          </a:p>
-        </p:txBody>
-      </p:sp>
-    </p:spTree>
-    <p:extLst>
-      <p:ext uri="{BB962C8B-B14F-4D97-AF65-F5344CB8AC3E}">
-        <p14:creationId xmlns:p14="http://schemas.microsoft.com/office/powerpoint/2010/main" val="3505201683"/>
-      </p:ext>
-    </p:extLst>
-  </p:cSld>
-  <p:clrMapOvr>
-    <a:masterClrMapping/>
-  </p:clrMapOvr>
-</p:sld>
-</file>
-
-<file path=ppt/slides/slide30.xml><?xml version="1.0" encoding="utf-8"?>
-<p:sld xmlns:a="http://schemas.openxmlformats.org/drawingml/2006/main" xmlns:r="http://schemas.openxmlformats.org/officeDocument/2006/relationships" xmlns:p="http://schemas.openxmlformats.org/presentationml/2006/main">
-  <p:cSld>
-    <p:spTree>
-      <p:nvGrpSpPr>
-        <p:cNvPr id="1" name=""/>
-        <p:cNvGrpSpPr/>
-        <p:nvPr/>
-      </p:nvGrpSpPr>
-      <p:grpSpPr>
-        <a:xfrm>
-          <a:off x="0" y="0"/>
-          <a:ext cx="0" cy="0"/>
-          <a:chOff x="0" y="0"/>
-          <a:chExt cx="0" cy="0"/>
-        </a:xfrm>
-      </p:grpSpPr>
-      <p:sp>
-        <p:nvSpPr>
-          <p:cNvPr id="2" name="Title 1">
-            <a:extLst>
-              <a:ext uri="{FF2B5EF4-FFF2-40B4-BE49-F238E27FC236}">
                 <a16:creationId xmlns:a16="http://schemas.microsoft.com/office/drawing/2014/main" id="{96849C2A-EAF1-C444-A539-1BAA796CDAB4}"/>
               </a:ext>
             </a:extLst>
@@ -8951,7 +9190,7 @@
           <a:p>
             <a:fld id="{925529E9-10DA-9F4C-A966-BE767707771B}" type="slidenum">
               <a:rPr lang="en-US" smtClean="0"/>
-              <a:t>30</a:t>
+              <a:t>31</a:t>
             </a:fld>
             <a:endParaRPr lang="en-US"/>
           </a:p>
@@ -9000,7 +9239,7 @@
 </p:sld>
 </file>
 
-<file path=ppt/slides/slide31.xml><?xml version="1.0" encoding="utf-8"?>
+<file path=ppt/slides/slide32.xml><?xml version="1.0" encoding="utf-8"?>
 <p:sld xmlns:a="http://schemas.openxmlformats.org/drawingml/2006/main" xmlns:r="http://schemas.openxmlformats.org/officeDocument/2006/relationships" xmlns:p="http://schemas.openxmlformats.org/presentationml/2006/main">
   <p:cSld>
     <p:spTree>
@@ -9222,7 +9461,7 @@
           <a:p>
             <a:fld id="{925529E9-10DA-9F4C-A966-BE767707771B}" type="slidenum">
               <a:rPr lang="en-US" smtClean="0"/>
-              <a:t>31</a:t>
+              <a:t>32</a:t>
             </a:fld>
             <a:endParaRPr lang="en-US"/>
           </a:p>
@@ -9271,7 +9510,7 @@
 </p:sld>
 </file>
 
-<file path=ppt/slides/slide32.xml><?xml version="1.0" encoding="utf-8"?>
+<file path=ppt/slides/slide33.xml><?xml version="1.0" encoding="utf-8"?>
 <p:sld xmlns:a="http://schemas.openxmlformats.org/drawingml/2006/main" xmlns:r="http://schemas.openxmlformats.org/officeDocument/2006/relationships" xmlns:p="http://schemas.openxmlformats.org/presentationml/2006/main">
   <p:cSld>
     <p:spTree>
@@ -9431,7 +9670,7 @@
           <a:p>
             <a:fld id="{925529E9-10DA-9F4C-A966-BE767707771B}" type="slidenum">
               <a:rPr lang="en-US" smtClean="0"/>
-              <a:t>32</a:t>
+              <a:t>33</a:t>
             </a:fld>
             <a:endParaRPr lang="en-US"/>
           </a:p>
@@ -9480,7 +9719,7 @@
 </p:sld>
 </file>
 
-<file path=ppt/slides/slide33.xml><?xml version="1.0" encoding="utf-8"?>
+<file path=ppt/slides/slide34.xml><?xml version="1.0" encoding="utf-8"?>
 <p:sld xmlns:a="http://schemas.openxmlformats.org/drawingml/2006/main" xmlns:r="http://schemas.openxmlformats.org/officeDocument/2006/relationships" xmlns:p="http://schemas.openxmlformats.org/presentationml/2006/main">
   <p:cSld>
     <p:spTree>
@@ -9651,7 +9890,7 @@
           <a:p>
             <a:fld id="{925529E9-10DA-9F4C-A966-BE767707771B}" type="slidenum">
               <a:rPr lang="en-US" smtClean="0"/>
-              <a:t>33</a:t>
+              <a:t>34</a:t>
             </a:fld>
             <a:endParaRPr lang="en-US"/>
           </a:p>
@@ -9700,7 +9939,7 @@
 </p:sld>
 </file>
 
-<file path=ppt/slides/slide34.xml><?xml version="1.0" encoding="utf-8"?>
+<file path=ppt/slides/slide35.xml><?xml version="1.0" encoding="utf-8"?>
 <p:sld xmlns:a="http://schemas.openxmlformats.org/drawingml/2006/main" xmlns:r="http://schemas.openxmlformats.org/officeDocument/2006/relationships" xmlns:p="http://schemas.openxmlformats.org/presentationml/2006/main">
   <p:cSld>
     <p:spTree>
@@ -9878,7 +10117,7 @@
           <a:p>
             <a:fld id="{925529E9-10DA-9F4C-A966-BE767707771B}" type="slidenum">
               <a:rPr lang="en-US" smtClean="0"/>
-              <a:t>34</a:t>
+              <a:t>35</a:t>
             </a:fld>
             <a:endParaRPr lang="en-US"/>
           </a:p>
@@ -9927,7 +10166,7 @@
 </p:sld>
 </file>
 
-<file path=ppt/slides/slide35.xml><?xml version="1.0" encoding="utf-8"?>
+<file path=ppt/slides/slide36.xml><?xml version="1.0" encoding="utf-8"?>
 <p:sld xmlns:a="http://schemas.openxmlformats.org/drawingml/2006/main" xmlns:r="http://schemas.openxmlformats.org/officeDocument/2006/relationships" xmlns:p="http://schemas.openxmlformats.org/presentationml/2006/main">
   <p:cSld>
     <p:spTree>
@@ -10098,7 +10337,7 @@
           <a:p>
             <a:fld id="{925529E9-10DA-9F4C-A966-BE767707771B}" type="slidenum">
               <a:rPr lang="en-US" smtClean="0"/>
-              <a:t>35</a:t>
+              <a:t>36</a:t>
             </a:fld>
             <a:endParaRPr lang="en-US"/>
           </a:p>
@@ -10147,7 +10386,7 @@
 </p:sld>
 </file>
 
-<file path=ppt/slides/slide36.xml><?xml version="1.0" encoding="utf-8"?>
+<file path=ppt/slides/slide37.xml><?xml version="1.0" encoding="utf-8"?>
 <p:sld xmlns:a="http://schemas.openxmlformats.org/drawingml/2006/main" xmlns:r="http://schemas.openxmlformats.org/officeDocument/2006/relationships" xmlns:p="http://schemas.openxmlformats.org/presentationml/2006/main">
   <p:cSld>
     <p:spTree>
@@ -10305,7 +10544,7 @@
           <a:p>
             <a:fld id="{925529E9-10DA-9F4C-A966-BE767707771B}" type="slidenum">
               <a:rPr lang="en-US" smtClean="0"/>
-              <a:t>36</a:t>
+              <a:t>37</a:t>
             </a:fld>
             <a:endParaRPr lang="en-US"/>
           </a:p>
@@ -10371,7 +10610,7 @@
           </a:ln>
           <a:extLst>
             <a:ext uri="{C572A759-6A51-4108-AA02-DFA0A04FC94B}">
-              <ma14:wrappingTextBoxFlag xmlns:ma14="http://schemas.microsoft.com/office/mac/drawingml/2011/main" xmlns="" val="1"/>
+              <ma14:wrappingTextBoxFlag xmlns="" xmlns:ma14="http://schemas.microsoft.com/office/mac/drawingml/2011/main" val="1"/>
             </a:ext>
           </a:extLst>
         </p:spPr>
@@ -10417,7 +10656,7 @@
           </a:ln>
           <a:extLst>
             <a:ext uri="{C572A759-6A51-4108-AA02-DFA0A04FC94B}">
-              <ma14:wrappingTextBoxFlag xmlns:ma14="http://schemas.microsoft.com/office/mac/drawingml/2011/main" xmlns="" val="1"/>
+              <ma14:wrappingTextBoxFlag xmlns="" xmlns:ma14="http://schemas.microsoft.com/office/mac/drawingml/2011/main" val="1"/>
             </a:ext>
           </a:extLst>
         </p:spPr>
@@ -10442,226 +10681,6 @@
     <p:extLst>
       <p:ext uri="{BB962C8B-B14F-4D97-AF65-F5344CB8AC3E}">
         <p14:creationId xmlns:p14="http://schemas.microsoft.com/office/powerpoint/2010/main" val="1912678882"/>
-      </p:ext>
-    </p:extLst>
-  </p:cSld>
-  <p:clrMapOvr>
-    <a:masterClrMapping/>
-  </p:clrMapOvr>
-</p:sld>
-</file>
-
-<file path=ppt/slides/slide37.xml><?xml version="1.0" encoding="utf-8"?>
-<p:sld xmlns:a="http://schemas.openxmlformats.org/drawingml/2006/main" xmlns:r="http://schemas.openxmlformats.org/officeDocument/2006/relationships" xmlns:p="http://schemas.openxmlformats.org/presentationml/2006/main">
-  <p:cSld>
-    <p:spTree>
-      <p:nvGrpSpPr>
-        <p:cNvPr id="1" name=""/>
-        <p:cNvGrpSpPr/>
-        <p:nvPr/>
-      </p:nvGrpSpPr>
-      <p:grpSpPr>
-        <a:xfrm>
-          <a:off x="0" y="0"/>
-          <a:ext cx="0" cy="0"/>
-          <a:chOff x="0" y="0"/>
-          <a:chExt cx="0" cy="0"/>
-        </a:xfrm>
-      </p:grpSpPr>
-      <p:pic>
-        <p:nvPicPr>
-          <p:cNvPr id="13" name="Picture 12">
-            <a:extLst>
-              <a:ext uri="{FF2B5EF4-FFF2-40B4-BE49-F238E27FC236}">
-                <a16:creationId xmlns:a16="http://schemas.microsoft.com/office/drawing/2014/main" id="{DEE34D5B-5E66-8D4E-9492-16B5958EC9D7}"/>
-              </a:ext>
-            </a:extLst>
-          </p:cNvPr>
-          <p:cNvPicPr>
-            <a:picLocks noChangeAspect="1"/>
-          </p:cNvPicPr>
-          <p:nvPr/>
-        </p:nvPicPr>
-        <p:blipFill>
-          <a:blip r:embed="rId2">
-            <a:extLst>
-              <a:ext uri="{BEBA8EAE-BF5A-486C-A8C5-ECC9F3942E4B}">
-                <a14:imgProps xmlns:a14="http://schemas.microsoft.com/office/drawing/2010/main">
-                  <a14:imgLayer>
-                    <a14:imgEffect>
-                      <a14:saturation sat="66000"/>
-                    </a14:imgEffect>
-                  </a14:imgLayer>
-                </a14:imgProps>
-              </a:ext>
-            </a:extLst>
-          </a:blip>
-          <a:stretch>
-            <a:fillRect/>
-          </a:stretch>
-        </p:blipFill>
-        <p:spPr>
-          <a:xfrm>
-            <a:off x="982980" y="1369567"/>
-            <a:ext cx="7178040" cy="4739436"/>
-          </a:xfrm>
-          <a:prstGeom prst="rect">
-            <a:avLst/>
-          </a:prstGeom>
-        </p:spPr>
-      </p:pic>
-      <p:sp>
-        <p:nvSpPr>
-          <p:cNvPr id="2" name="Title 1">
-            <a:extLst>
-              <a:ext uri="{FF2B5EF4-FFF2-40B4-BE49-F238E27FC236}">
-                <a16:creationId xmlns:a16="http://schemas.microsoft.com/office/drawing/2014/main" id="{5FC4F97E-FBCB-004F-8C19-4AA968C89AFB}"/>
-              </a:ext>
-            </a:extLst>
-          </p:cNvPr>
-          <p:cNvSpPr>
-            <a:spLocks noGrp="1"/>
-          </p:cNvSpPr>
-          <p:nvPr>
-            <p:ph type="title"/>
-          </p:nvPr>
-        </p:nvSpPr>
-        <p:spPr/>
-        <p:txBody>
-          <a:bodyPr/>
-          <a:lstStyle/>
-          <a:p>
-            <a:r>
-              <a:rPr lang="en-US" dirty="0"/>
-              <a:t>Multiplier, Divider</a:t>
-            </a:r>
-          </a:p>
-        </p:txBody>
-      </p:sp>
-      <p:sp>
-        <p:nvSpPr>
-          <p:cNvPr id="3" name="Content Placeholder 2">
-            <a:extLst>
-              <a:ext uri="{FF2B5EF4-FFF2-40B4-BE49-F238E27FC236}">
-                <a16:creationId xmlns:a16="http://schemas.microsoft.com/office/drawing/2014/main" id="{141BA08E-76C2-7E47-870C-227268B4E418}"/>
-              </a:ext>
-            </a:extLst>
-          </p:cNvPr>
-          <p:cNvSpPr>
-            <a:spLocks noGrp="1"/>
-          </p:cNvSpPr>
-          <p:nvPr>
-            <p:ph idx="1"/>
-          </p:nvPr>
-        </p:nvSpPr>
-        <p:spPr/>
-        <p:txBody>
-          <a:bodyPr/>
-          <a:lstStyle/>
-          <a:p>
-            <a:endParaRPr lang="en-US" b="1" dirty="0"/>
-          </a:p>
-          <a:p>
-            <a:r>
-              <a:rPr lang="en-US" b="1" dirty="0"/>
-              <a:t>Multiplier architecture</a:t>
-            </a:r>
-          </a:p>
-          <a:p>
-            <a:pPr lvl="1"/>
-            <a:endParaRPr lang="en-US" dirty="0"/>
-          </a:p>
-        </p:txBody>
-      </p:sp>
-      <p:sp>
-        <p:nvSpPr>
-          <p:cNvPr id="4" name="Date Placeholder 3">
-            <a:extLst>
-              <a:ext uri="{FF2B5EF4-FFF2-40B4-BE49-F238E27FC236}">
-                <a16:creationId xmlns:a16="http://schemas.microsoft.com/office/drawing/2014/main" id="{EAEFB8FF-ED7B-F94D-959F-81DA00DE104A}"/>
-              </a:ext>
-            </a:extLst>
-          </p:cNvPr>
-          <p:cNvSpPr>
-            <a:spLocks noGrp="1"/>
-          </p:cNvSpPr>
-          <p:nvPr>
-            <p:ph type="dt" sz="half" idx="10"/>
-          </p:nvPr>
-        </p:nvSpPr>
-        <p:spPr/>
-        <p:txBody>
-          <a:bodyPr/>
-          <a:lstStyle/>
-          <a:p>
-            <a:r>
-              <a:rPr lang="en-US"/>
-              <a:t>2018.6.21</a:t>
-            </a:r>
-          </a:p>
-        </p:txBody>
-      </p:sp>
-      <p:sp>
-        <p:nvSpPr>
-          <p:cNvPr id="5" name="Footer Placeholder 4">
-            <a:extLst>
-              <a:ext uri="{FF2B5EF4-FFF2-40B4-BE49-F238E27FC236}">
-                <a16:creationId xmlns:a16="http://schemas.microsoft.com/office/drawing/2014/main" id="{D12C5FA7-FA1D-7B49-AF2D-37070D52B5A6}"/>
-              </a:ext>
-            </a:extLst>
-          </p:cNvPr>
-          <p:cNvSpPr>
-            <a:spLocks noGrp="1"/>
-          </p:cNvSpPr>
-          <p:nvPr>
-            <p:ph type="ftr" sz="quarter" idx="11"/>
-          </p:nvPr>
-        </p:nvSpPr>
-        <p:spPr/>
-        <p:txBody>
-          <a:bodyPr/>
-          <a:lstStyle/>
-          <a:p>
-            <a:r>
-              <a:rPr lang="en-US"/>
-              <a:t>Digital System Design Final Project</a:t>
-            </a:r>
-          </a:p>
-        </p:txBody>
-      </p:sp>
-      <p:sp>
-        <p:nvSpPr>
-          <p:cNvPr id="6" name="Slide Number Placeholder 5">
-            <a:extLst>
-              <a:ext uri="{FF2B5EF4-FFF2-40B4-BE49-F238E27FC236}">
-                <a16:creationId xmlns:a16="http://schemas.microsoft.com/office/drawing/2014/main" id="{C6C41A2D-2DCD-0E4C-B0EC-140E2EC42590}"/>
-              </a:ext>
-            </a:extLst>
-          </p:cNvPr>
-          <p:cNvSpPr>
-            <a:spLocks noGrp="1"/>
-          </p:cNvSpPr>
-          <p:nvPr>
-            <p:ph type="sldNum" sz="quarter" idx="12"/>
-          </p:nvPr>
-        </p:nvSpPr>
-        <p:spPr/>
-        <p:txBody>
-          <a:bodyPr/>
-          <a:lstStyle/>
-          <a:p>
-            <a:fld id="{925529E9-10DA-9F4C-A966-BE767707771B}" type="slidenum">
-              <a:rPr lang="en-US" smtClean="0"/>
-              <a:t>37</a:t>
-            </a:fld>
-            <a:endParaRPr lang="en-US" dirty="0"/>
-          </a:p>
-        </p:txBody>
-      </p:sp>
-    </p:spTree>
-    <p:extLst>
-      <p:ext uri="{BB962C8B-B14F-4D97-AF65-F5344CB8AC3E}">
-        <p14:creationId xmlns:p14="http://schemas.microsoft.com/office/powerpoint/2010/main" val="1166395514"/>
       </p:ext>
     </p:extLst>
   </p:cSld>
@@ -10690,10 +10709,10 @@
       </p:grpSpPr>
       <p:pic>
         <p:nvPicPr>
-          <p:cNvPr id="12" name="Picture 11">
-            <a:extLst>
-              <a:ext uri="{FF2B5EF4-FFF2-40B4-BE49-F238E27FC236}">
-                <a16:creationId xmlns:a16="http://schemas.microsoft.com/office/drawing/2014/main" id="{CCEA5B06-AC07-F74F-9BEC-154F889EFE97}"/>
+          <p:cNvPr id="13" name="Picture 12">
+            <a:extLst>
+              <a:ext uri="{FF2B5EF4-FFF2-40B4-BE49-F238E27FC236}">
+                <a16:creationId xmlns:a16="http://schemas.microsoft.com/office/drawing/2014/main" id="{DEE34D5B-5E66-8D4E-9492-16B5958EC9D7}"/>
               </a:ext>
             </a:extLst>
           </p:cNvPr>
@@ -10722,8 +10741,8 @@
         </p:blipFill>
         <p:spPr>
           <a:xfrm>
-            <a:off x="628650" y="1217848"/>
-            <a:ext cx="7886700" cy="4833784"/>
+            <a:off x="982980" y="1369567"/>
+            <a:ext cx="7178040" cy="4739436"/>
           </a:xfrm>
           <a:prstGeom prst="rect">
             <a:avLst/>
@@ -10735,7 +10754,7 @@
           <p:cNvPr id="2" name="Title 1">
             <a:extLst>
               <a:ext uri="{FF2B5EF4-FFF2-40B4-BE49-F238E27FC236}">
-                <a16:creationId xmlns:a16="http://schemas.microsoft.com/office/drawing/2014/main" id="{DE08E9F9-3B67-BA4D-B9FA-74059A2EF482}"/>
+                <a16:creationId xmlns:a16="http://schemas.microsoft.com/office/drawing/2014/main" id="{5FC4F97E-FBCB-004F-8C19-4AA968C89AFB}"/>
               </a:ext>
             </a:extLst>
           </p:cNvPr>
@@ -10763,7 +10782,7 @@
           <p:cNvPr id="3" name="Content Placeholder 2">
             <a:extLst>
               <a:ext uri="{FF2B5EF4-FFF2-40B4-BE49-F238E27FC236}">
-                <a16:creationId xmlns:a16="http://schemas.microsoft.com/office/drawing/2014/main" id="{3E08C796-B86F-6E4E-9039-CB94714724C3}"/>
+                <a16:creationId xmlns:a16="http://schemas.microsoft.com/office/drawing/2014/main" id="{141BA08E-76C2-7E47-870C-227268B4E418}"/>
               </a:ext>
             </a:extLst>
           </p:cNvPr>
@@ -10784,10 +10803,11 @@
           <a:p>
             <a:r>
               <a:rPr lang="en-US" b="1" dirty="0"/>
-              <a:t>Divider architecture</a:t>
-            </a:r>
-          </a:p>
-          <a:p>
+              <a:t>Multiplier architecture</a:t>
+            </a:r>
+          </a:p>
+          <a:p>
+            <a:pPr lvl="1"/>
             <a:endParaRPr lang="en-US" dirty="0"/>
           </a:p>
         </p:txBody>
@@ -10797,7 +10817,7 @@
           <p:cNvPr id="4" name="Date Placeholder 3">
             <a:extLst>
               <a:ext uri="{FF2B5EF4-FFF2-40B4-BE49-F238E27FC236}">
-                <a16:creationId xmlns:a16="http://schemas.microsoft.com/office/drawing/2014/main" id="{0F1E25B8-5816-E342-BEED-A8EC4439F664}"/>
+                <a16:creationId xmlns:a16="http://schemas.microsoft.com/office/drawing/2014/main" id="{EAEFB8FF-ED7B-F94D-959F-81DA00DE104A}"/>
               </a:ext>
             </a:extLst>
           </p:cNvPr>
@@ -10825,7 +10845,7 @@
           <p:cNvPr id="5" name="Footer Placeholder 4">
             <a:extLst>
               <a:ext uri="{FF2B5EF4-FFF2-40B4-BE49-F238E27FC236}">
-                <a16:creationId xmlns:a16="http://schemas.microsoft.com/office/drawing/2014/main" id="{17B80B39-D257-DF4B-A115-D35BAC2905BA}"/>
+                <a16:creationId xmlns:a16="http://schemas.microsoft.com/office/drawing/2014/main" id="{D12C5FA7-FA1D-7B49-AF2D-37070D52B5A6}"/>
               </a:ext>
             </a:extLst>
           </p:cNvPr>
@@ -10853,7 +10873,7 @@
           <p:cNvPr id="6" name="Slide Number Placeholder 5">
             <a:extLst>
               <a:ext uri="{FF2B5EF4-FFF2-40B4-BE49-F238E27FC236}">
-                <a16:creationId xmlns:a16="http://schemas.microsoft.com/office/drawing/2014/main" id="{3C945458-B398-C844-8AFF-6DE396957133}"/>
+                <a16:creationId xmlns:a16="http://schemas.microsoft.com/office/drawing/2014/main" id="{C6C41A2D-2DCD-0E4C-B0EC-140E2EC42590}"/>
               </a:ext>
             </a:extLst>
           </p:cNvPr>
@@ -10873,14 +10893,14 @@
               <a:rPr lang="en-US" smtClean="0"/>
               <a:t>38</a:t>
             </a:fld>
-            <a:endParaRPr lang="en-US"/>
+            <a:endParaRPr lang="en-US" dirty="0"/>
           </a:p>
         </p:txBody>
       </p:sp>
     </p:spTree>
     <p:extLst>
       <p:ext uri="{BB962C8B-B14F-4D97-AF65-F5344CB8AC3E}">
-        <p14:creationId xmlns:p14="http://schemas.microsoft.com/office/powerpoint/2010/main" val="2471955783"/>
+        <p14:creationId xmlns:p14="http://schemas.microsoft.com/office/powerpoint/2010/main" val="1166395514"/>
       </p:ext>
     </p:extLst>
   </p:cSld>
@@ -10907,12 +10927,54 @@
           <a:chExt cx="0" cy="0"/>
         </a:xfrm>
       </p:grpSpPr>
+      <p:pic>
+        <p:nvPicPr>
+          <p:cNvPr id="12" name="Picture 11">
+            <a:extLst>
+              <a:ext uri="{FF2B5EF4-FFF2-40B4-BE49-F238E27FC236}">
+                <a16:creationId xmlns:a16="http://schemas.microsoft.com/office/drawing/2014/main" id="{CCEA5B06-AC07-F74F-9BEC-154F889EFE97}"/>
+              </a:ext>
+            </a:extLst>
+          </p:cNvPr>
+          <p:cNvPicPr>
+            <a:picLocks noChangeAspect="1"/>
+          </p:cNvPicPr>
+          <p:nvPr/>
+        </p:nvPicPr>
+        <p:blipFill>
+          <a:blip r:embed="rId2">
+            <a:extLst>
+              <a:ext uri="{BEBA8EAE-BF5A-486C-A8C5-ECC9F3942E4B}">
+                <a14:imgProps xmlns:a14="http://schemas.microsoft.com/office/drawing/2010/main">
+                  <a14:imgLayer>
+                    <a14:imgEffect>
+                      <a14:saturation sat="66000"/>
+                    </a14:imgEffect>
+                  </a14:imgLayer>
+                </a14:imgProps>
+              </a:ext>
+            </a:extLst>
+          </a:blip>
+          <a:stretch>
+            <a:fillRect/>
+          </a:stretch>
+        </p:blipFill>
+        <p:spPr>
+          <a:xfrm>
+            <a:off x="628650" y="1217848"/>
+            <a:ext cx="7886700" cy="4833784"/>
+          </a:xfrm>
+          <a:prstGeom prst="rect">
+            <a:avLst/>
+          </a:prstGeom>
+        </p:spPr>
+      </p:pic>
       <p:sp>
         <p:nvSpPr>
           <p:cNvPr id="2" name="Title 1">
             <a:extLst>
               <a:ext uri="{FF2B5EF4-FFF2-40B4-BE49-F238E27FC236}">
-                <a16:creationId xmlns:a16="http://schemas.microsoft.com/office/drawing/2014/main" id="{59DCC9B8-FAA4-7344-8DEA-7FF1469D2DB0}"/>
+                <a16:creationId xmlns:a16="http://schemas.microsoft.com/office/drawing/2014/main" id="{DE08E9F9-3B67-BA4D-B9FA-74059A2EF482}"/>
               </a:ext>
             </a:extLst>
           </p:cNvPr>
@@ -10940,7 +11002,7 @@
           <p:cNvPr id="3" name="Content Placeholder 2">
             <a:extLst>
               <a:ext uri="{FF2B5EF4-FFF2-40B4-BE49-F238E27FC236}">
-                <a16:creationId xmlns:a16="http://schemas.microsoft.com/office/drawing/2014/main" id="{F3EE3157-C8E6-6041-A308-07718BB4A06F}"/>
+                <a16:creationId xmlns:a16="http://schemas.microsoft.com/office/drawing/2014/main" id="{3E08C796-B86F-6E4E-9039-CB94714724C3}"/>
               </a:ext>
             </a:extLst>
           </p:cNvPr>
@@ -10956,95 +11018,17 @@
           <a:bodyPr/>
           <a:lstStyle/>
           <a:p>
+            <a:endParaRPr lang="en-US" b="1" dirty="0"/>
+          </a:p>
+          <a:p>
             <a:r>
               <a:rPr lang="en-US" b="1" dirty="0"/>
-              <a:t>Signed division</a:t>
-            </a:r>
-          </a:p>
-          <a:p>
-            <a:pPr lvl="1"/>
+              <a:t>Divider architecture</a:t>
+            </a:r>
+          </a:p>
+          <a:p>
             <a:endParaRPr lang="en-US" dirty="0"/>
           </a:p>
-          <a:p>
-            <a:pPr marL="914400" lvl="1" indent="-457200">
-              <a:buFont typeface="+mj-lt"/>
-              <a:buAutoNum type="arabicPeriod"/>
-            </a:pPr>
-            <a:r>
-              <a:rPr lang="en-US" b="1" dirty="0">
-                <a:solidFill>
-                  <a:srgbClr val="C00000"/>
-                </a:solidFill>
-              </a:rPr>
-              <a:t>Convert the dividend and divisor to positive</a:t>
-            </a:r>
-          </a:p>
-          <a:p>
-            <a:pPr marL="914400" lvl="1" indent="-457200">
-              <a:buFont typeface="+mj-lt"/>
-              <a:buAutoNum type="arabicPeriod"/>
-            </a:pPr>
-            <a:endParaRPr lang="en-US" dirty="0"/>
-          </a:p>
-          <a:p>
-            <a:pPr marL="914400" lvl="1" indent="-457200">
-              <a:buFont typeface="+mj-lt"/>
-              <a:buAutoNum type="arabicPeriod"/>
-            </a:pPr>
-            <a:r>
-              <a:rPr lang="en-US" b="1" dirty="0">
-                <a:solidFill>
-                  <a:schemeClr val="accent6">
-                    <a:lumMod val="50000"/>
-                  </a:schemeClr>
-                </a:solidFill>
-              </a:rPr>
-              <a:t>Do unsigned division</a:t>
-            </a:r>
-          </a:p>
-          <a:p>
-            <a:pPr marL="914400" lvl="1" indent="-457200">
-              <a:buFont typeface="+mj-lt"/>
-              <a:buAutoNum type="arabicPeriod"/>
-            </a:pPr>
-            <a:endParaRPr lang="en-US" dirty="0"/>
-          </a:p>
-          <a:p>
-            <a:pPr marL="914400" lvl="1" indent="-457200">
-              <a:buFont typeface="+mj-lt"/>
-              <a:buAutoNum type="arabicPeriod"/>
-            </a:pPr>
-            <a:r>
-              <a:rPr lang="en-US" b="1" dirty="0">
-                <a:solidFill>
-                  <a:srgbClr val="0070C0"/>
-                </a:solidFill>
-              </a:rPr>
-              <a:t>Compute the signs of the quotient and remainder</a:t>
-            </a:r>
-          </a:p>
-          <a:p>
-            <a:pPr lvl="2"/>
-            <a:r>
-              <a:rPr lang="en-US" dirty="0"/>
-              <a:t>(Quotient sign)     = (Dividend sign) XOR (Divisor sign)</a:t>
-            </a:r>
-          </a:p>
-          <a:p>
-            <a:pPr lvl="2"/>
-            <a:r>
-              <a:rPr lang="en-US" dirty="0"/>
-              <a:t>(Remainder sign)</a:t>
-            </a:r>
-            <a:r>
-              <a:rPr lang="en-US" sz="900" dirty="0"/>
-              <a:t> </a:t>
-            </a:r>
-            <a:r>
-              <a:rPr lang="en-US" dirty="0"/>
-              <a:t> = (Dividend sign)</a:t>
-            </a:r>
-          </a:p>
         </p:txBody>
       </p:sp>
       <p:sp>
@@ -11052,7 +11036,7 @@
           <p:cNvPr id="4" name="Date Placeholder 3">
             <a:extLst>
               <a:ext uri="{FF2B5EF4-FFF2-40B4-BE49-F238E27FC236}">
-                <a16:creationId xmlns:a16="http://schemas.microsoft.com/office/drawing/2014/main" id="{419867C8-0BF6-3F4D-946A-E5594510EC8A}"/>
+                <a16:creationId xmlns:a16="http://schemas.microsoft.com/office/drawing/2014/main" id="{0F1E25B8-5816-E342-BEED-A8EC4439F664}"/>
               </a:ext>
             </a:extLst>
           </p:cNvPr>
@@ -11080,7 +11064,7 @@
           <p:cNvPr id="5" name="Footer Placeholder 4">
             <a:extLst>
               <a:ext uri="{FF2B5EF4-FFF2-40B4-BE49-F238E27FC236}">
-                <a16:creationId xmlns:a16="http://schemas.microsoft.com/office/drawing/2014/main" id="{255D4E30-B009-F94A-8861-48CFCCD18E2C}"/>
+                <a16:creationId xmlns:a16="http://schemas.microsoft.com/office/drawing/2014/main" id="{17B80B39-D257-DF4B-A115-D35BAC2905BA}"/>
               </a:ext>
             </a:extLst>
           </p:cNvPr>
@@ -11108,7 +11092,7 @@
           <p:cNvPr id="6" name="Slide Number Placeholder 5">
             <a:extLst>
               <a:ext uri="{FF2B5EF4-FFF2-40B4-BE49-F238E27FC236}">
-                <a16:creationId xmlns:a16="http://schemas.microsoft.com/office/drawing/2014/main" id="{291DD157-E391-3E4E-90D1-EB32D2B9BF98}"/>
+                <a16:creationId xmlns:a16="http://schemas.microsoft.com/office/drawing/2014/main" id="{3C945458-B398-C844-8AFF-6DE396957133}"/>
               </a:ext>
             </a:extLst>
           </p:cNvPr>
@@ -11135,7 +11119,7 @@
     </p:spTree>
     <p:extLst>
       <p:ext uri="{BB962C8B-B14F-4D97-AF65-F5344CB8AC3E}">
-        <p14:creationId xmlns:p14="http://schemas.microsoft.com/office/powerpoint/2010/main" val="941008399"/>
+        <p14:creationId xmlns:p14="http://schemas.microsoft.com/office/powerpoint/2010/main" val="2471955783"/>
       </p:ext>
     </p:extLst>
   </p:cSld>
@@ -11387,6 +11371,261 @@
           <p:cNvPr id="2" name="Title 1">
             <a:extLst>
               <a:ext uri="{FF2B5EF4-FFF2-40B4-BE49-F238E27FC236}">
+                <a16:creationId xmlns:a16="http://schemas.microsoft.com/office/drawing/2014/main" id="{59DCC9B8-FAA4-7344-8DEA-7FF1469D2DB0}"/>
+              </a:ext>
+            </a:extLst>
+          </p:cNvPr>
+          <p:cNvSpPr>
+            <a:spLocks noGrp="1"/>
+          </p:cNvSpPr>
+          <p:nvPr>
+            <p:ph type="title"/>
+          </p:nvPr>
+        </p:nvSpPr>
+        <p:spPr/>
+        <p:txBody>
+          <a:bodyPr/>
+          <a:lstStyle/>
+          <a:p>
+            <a:r>
+              <a:rPr lang="en-US" dirty="0"/>
+              <a:t>Multiplier, Divider</a:t>
+            </a:r>
+          </a:p>
+        </p:txBody>
+      </p:sp>
+      <p:sp>
+        <p:nvSpPr>
+          <p:cNvPr id="3" name="Content Placeholder 2">
+            <a:extLst>
+              <a:ext uri="{FF2B5EF4-FFF2-40B4-BE49-F238E27FC236}">
+                <a16:creationId xmlns:a16="http://schemas.microsoft.com/office/drawing/2014/main" id="{F3EE3157-C8E6-6041-A308-07718BB4A06F}"/>
+              </a:ext>
+            </a:extLst>
+          </p:cNvPr>
+          <p:cNvSpPr>
+            <a:spLocks noGrp="1"/>
+          </p:cNvSpPr>
+          <p:nvPr>
+            <p:ph idx="1"/>
+          </p:nvPr>
+        </p:nvSpPr>
+        <p:spPr/>
+        <p:txBody>
+          <a:bodyPr/>
+          <a:lstStyle/>
+          <a:p>
+            <a:r>
+              <a:rPr lang="en-US" b="1" dirty="0"/>
+              <a:t>Signed division</a:t>
+            </a:r>
+          </a:p>
+          <a:p>
+            <a:pPr lvl="1"/>
+            <a:endParaRPr lang="en-US" dirty="0"/>
+          </a:p>
+          <a:p>
+            <a:pPr marL="914400" lvl="1" indent="-457200">
+              <a:buFont typeface="+mj-lt"/>
+              <a:buAutoNum type="arabicPeriod"/>
+            </a:pPr>
+            <a:r>
+              <a:rPr lang="en-US" b="1" dirty="0">
+                <a:solidFill>
+                  <a:srgbClr val="C00000"/>
+                </a:solidFill>
+              </a:rPr>
+              <a:t>Convert the dividend and divisor to positive</a:t>
+            </a:r>
+          </a:p>
+          <a:p>
+            <a:pPr marL="914400" lvl="1" indent="-457200">
+              <a:buFont typeface="+mj-lt"/>
+              <a:buAutoNum type="arabicPeriod"/>
+            </a:pPr>
+            <a:endParaRPr lang="en-US" dirty="0"/>
+          </a:p>
+          <a:p>
+            <a:pPr marL="914400" lvl="1" indent="-457200">
+              <a:buFont typeface="+mj-lt"/>
+              <a:buAutoNum type="arabicPeriod"/>
+            </a:pPr>
+            <a:r>
+              <a:rPr lang="en-US" b="1" dirty="0">
+                <a:solidFill>
+                  <a:schemeClr val="accent6">
+                    <a:lumMod val="50000"/>
+                  </a:schemeClr>
+                </a:solidFill>
+              </a:rPr>
+              <a:t>Do unsigned division</a:t>
+            </a:r>
+          </a:p>
+          <a:p>
+            <a:pPr marL="914400" lvl="1" indent="-457200">
+              <a:buFont typeface="+mj-lt"/>
+              <a:buAutoNum type="arabicPeriod"/>
+            </a:pPr>
+            <a:endParaRPr lang="en-US" dirty="0"/>
+          </a:p>
+          <a:p>
+            <a:pPr marL="914400" lvl="1" indent="-457200">
+              <a:buFont typeface="+mj-lt"/>
+              <a:buAutoNum type="arabicPeriod"/>
+            </a:pPr>
+            <a:r>
+              <a:rPr lang="en-US" b="1" dirty="0">
+                <a:solidFill>
+                  <a:srgbClr val="0070C0"/>
+                </a:solidFill>
+              </a:rPr>
+              <a:t>Compute the signs of the quotient and remainder</a:t>
+            </a:r>
+          </a:p>
+          <a:p>
+            <a:pPr lvl="2"/>
+            <a:r>
+              <a:rPr lang="en-US" dirty="0"/>
+              <a:t>(Quotient sign)     = (Dividend sign) XOR (Divisor sign)</a:t>
+            </a:r>
+          </a:p>
+          <a:p>
+            <a:pPr lvl="2"/>
+            <a:r>
+              <a:rPr lang="en-US" dirty="0"/>
+              <a:t>(Remainder sign)</a:t>
+            </a:r>
+            <a:r>
+              <a:rPr lang="en-US" sz="900" dirty="0"/>
+              <a:t> </a:t>
+            </a:r>
+            <a:r>
+              <a:rPr lang="en-US" dirty="0"/>
+              <a:t> = (Dividend sign)</a:t>
+            </a:r>
+          </a:p>
+        </p:txBody>
+      </p:sp>
+      <p:sp>
+        <p:nvSpPr>
+          <p:cNvPr id="4" name="Date Placeholder 3">
+            <a:extLst>
+              <a:ext uri="{FF2B5EF4-FFF2-40B4-BE49-F238E27FC236}">
+                <a16:creationId xmlns:a16="http://schemas.microsoft.com/office/drawing/2014/main" id="{419867C8-0BF6-3F4D-946A-E5594510EC8A}"/>
+              </a:ext>
+            </a:extLst>
+          </p:cNvPr>
+          <p:cNvSpPr>
+            <a:spLocks noGrp="1"/>
+          </p:cNvSpPr>
+          <p:nvPr>
+            <p:ph type="dt" sz="half" idx="10"/>
+          </p:nvPr>
+        </p:nvSpPr>
+        <p:spPr/>
+        <p:txBody>
+          <a:bodyPr/>
+          <a:lstStyle/>
+          <a:p>
+            <a:r>
+              <a:rPr lang="en-US"/>
+              <a:t>2018.6.21</a:t>
+            </a:r>
+          </a:p>
+        </p:txBody>
+      </p:sp>
+      <p:sp>
+        <p:nvSpPr>
+          <p:cNvPr id="5" name="Footer Placeholder 4">
+            <a:extLst>
+              <a:ext uri="{FF2B5EF4-FFF2-40B4-BE49-F238E27FC236}">
+                <a16:creationId xmlns:a16="http://schemas.microsoft.com/office/drawing/2014/main" id="{255D4E30-B009-F94A-8861-48CFCCD18E2C}"/>
+              </a:ext>
+            </a:extLst>
+          </p:cNvPr>
+          <p:cNvSpPr>
+            <a:spLocks noGrp="1"/>
+          </p:cNvSpPr>
+          <p:nvPr>
+            <p:ph type="ftr" sz="quarter" idx="11"/>
+          </p:nvPr>
+        </p:nvSpPr>
+        <p:spPr/>
+        <p:txBody>
+          <a:bodyPr/>
+          <a:lstStyle/>
+          <a:p>
+            <a:r>
+              <a:rPr lang="en-US"/>
+              <a:t>Digital System Design Final Project</a:t>
+            </a:r>
+          </a:p>
+        </p:txBody>
+      </p:sp>
+      <p:sp>
+        <p:nvSpPr>
+          <p:cNvPr id="6" name="Slide Number Placeholder 5">
+            <a:extLst>
+              <a:ext uri="{FF2B5EF4-FFF2-40B4-BE49-F238E27FC236}">
+                <a16:creationId xmlns:a16="http://schemas.microsoft.com/office/drawing/2014/main" id="{291DD157-E391-3E4E-90D1-EB32D2B9BF98}"/>
+              </a:ext>
+            </a:extLst>
+          </p:cNvPr>
+          <p:cNvSpPr>
+            <a:spLocks noGrp="1"/>
+          </p:cNvSpPr>
+          <p:nvPr>
+            <p:ph type="sldNum" sz="quarter" idx="12"/>
+          </p:nvPr>
+        </p:nvSpPr>
+        <p:spPr/>
+        <p:txBody>
+          <a:bodyPr/>
+          <a:lstStyle/>
+          <a:p>
+            <a:fld id="{925529E9-10DA-9F4C-A966-BE767707771B}" type="slidenum">
+              <a:rPr lang="en-US" smtClean="0"/>
+              <a:t>40</a:t>
+            </a:fld>
+            <a:endParaRPr lang="en-US"/>
+          </a:p>
+        </p:txBody>
+      </p:sp>
+    </p:spTree>
+    <p:extLst>
+      <p:ext uri="{BB962C8B-B14F-4D97-AF65-F5344CB8AC3E}">
+        <p14:creationId xmlns:p14="http://schemas.microsoft.com/office/powerpoint/2010/main" val="941008399"/>
+      </p:ext>
+    </p:extLst>
+  </p:cSld>
+  <p:clrMapOvr>
+    <a:masterClrMapping/>
+  </p:clrMapOvr>
+</p:sld>
+</file>
+
+<file path=ppt/slides/slide41.xml><?xml version="1.0" encoding="utf-8"?>
+<p:sld xmlns:a="http://schemas.openxmlformats.org/drawingml/2006/main" xmlns:r="http://schemas.openxmlformats.org/officeDocument/2006/relationships" xmlns:p="http://schemas.openxmlformats.org/presentationml/2006/main">
+  <p:cSld>
+    <p:spTree>
+      <p:nvGrpSpPr>
+        <p:cNvPr id="1" name=""/>
+        <p:cNvGrpSpPr/>
+        <p:nvPr/>
+      </p:nvGrpSpPr>
+      <p:grpSpPr>
+        <a:xfrm>
+          <a:off x="0" y="0"/>
+          <a:ext cx="0" cy="0"/>
+          <a:chOff x="0" y="0"/>
+          <a:chExt cx="0" cy="0"/>
+        </a:xfrm>
+      </p:grpSpPr>
+      <p:sp>
+        <p:nvSpPr>
+          <p:cNvPr id="2" name="Title 1">
+            <a:extLst>
+              <a:ext uri="{FF2B5EF4-FFF2-40B4-BE49-F238E27FC236}">
                 <a16:creationId xmlns:a16="http://schemas.microsoft.com/office/drawing/2014/main" id="{EA259C2B-D86F-7C44-8CF0-11D9048D97B7}"/>
               </a:ext>
             </a:extLst>
@@ -11616,7 +11855,7 @@
           <a:p>
             <a:fld id="{925529E9-10DA-9F4C-A966-BE767707771B}" type="slidenum">
               <a:rPr lang="en-US" smtClean="0"/>
-              <a:t>40</a:t>
+              <a:t>41</a:t>
             </a:fld>
             <a:endParaRPr lang="en-US"/>
           </a:p>
@@ -11739,7 +11978,7 @@
 </p:sld>
 </file>
 
-<file path=ppt/slides/slide41.xml><?xml version="1.0" encoding="utf-8"?>
+<file path=ppt/slides/slide42.xml><?xml version="1.0" encoding="utf-8"?>
 <p:sld xmlns:a="http://schemas.openxmlformats.org/drawingml/2006/main" xmlns:r="http://schemas.openxmlformats.org/officeDocument/2006/relationships" xmlns:p="http://schemas.openxmlformats.org/presentationml/2006/main">
   <p:cSld>
     <p:spTree>
@@ -11910,7 +12149,7 @@
           <a:p>
             <a:fld id="{925529E9-10DA-9F4C-A966-BE767707771B}" type="slidenum">
               <a:rPr lang="en-US" smtClean="0"/>
-              <a:t>41</a:t>
+              <a:t>42</a:t>
             </a:fld>
             <a:endParaRPr lang="en-US"/>
           </a:p>
@@ -12767,9 +13006,10 @@
           <a:lstStyle/>
           <a:p>
             <a:r>
-              <a:rPr lang="en-US" dirty="0"/>
-              <a:t>Branching</a:t>
-            </a:r>
+              <a:rPr lang="en-US"/>
+              <a:t>Branch</a:t>
+            </a:r>
+            <a:endParaRPr lang="en-US" dirty="0"/>
           </a:p>
         </p:txBody>
       </p:sp>

</xml_diff>